<commit_message>
Tried to correct the model...
</commit_message>
<xml_diff>
--- a/Figures/SpindleFBDfigure_1.pptx
+++ b/Figures/SpindleFBDfigure_1.pptx
@@ -300,7 +300,7 @@
           <a:p>
             <a:fld id="{6AFFC431-35AA-48DF-B824-772EF10EA9D4}" type="datetimeFigureOut">
               <a:rPr lang="en-US" smtClean="0"/>
-              <a:t>3/10/2023</a:t>
+              <a:t>3/12/2023</a:t>
             </a:fld>
             <a:endParaRPr lang="en-US"/>
           </a:p>
@@ -498,7 +498,7 @@
           <a:p>
             <a:fld id="{6AFFC431-35AA-48DF-B824-772EF10EA9D4}" type="datetimeFigureOut">
               <a:rPr lang="en-US" smtClean="0"/>
-              <a:t>3/10/2023</a:t>
+              <a:t>3/12/2023</a:t>
             </a:fld>
             <a:endParaRPr lang="en-US"/>
           </a:p>
@@ -706,7 +706,7 @@
           <a:p>
             <a:fld id="{6AFFC431-35AA-48DF-B824-772EF10EA9D4}" type="datetimeFigureOut">
               <a:rPr lang="en-US" smtClean="0"/>
-              <a:t>3/10/2023</a:t>
+              <a:t>3/12/2023</a:t>
             </a:fld>
             <a:endParaRPr lang="en-US"/>
           </a:p>
@@ -904,7 +904,7 @@
           <a:p>
             <a:fld id="{6AFFC431-35AA-48DF-B824-772EF10EA9D4}" type="datetimeFigureOut">
               <a:rPr lang="en-US" smtClean="0"/>
-              <a:t>3/10/2023</a:t>
+              <a:t>3/12/2023</a:t>
             </a:fld>
             <a:endParaRPr lang="en-US"/>
           </a:p>
@@ -1179,7 +1179,7 @@
           <a:p>
             <a:fld id="{6AFFC431-35AA-48DF-B824-772EF10EA9D4}" type="datetimeFigureOut">
               <a:rPr lang="en-US" smtClean="0"/>
-              <a:t>3/10/2023</a:t>
+              <a:t>3/12/2023</a:t>
             </a:fld>
             <a:endParaRPr lang="en-US"/>
           </a:p>
@@ -1444,7 +1444,7 @@
           <a:p>
             <a:fld id="{6AFFC431-35AA-48DF-B824-772EF10EA9D4}" type="datetimeFigureOut">
               <a:rPr lang="en-US" smtClean="0"/>
-              <a:t>3/10/2023</a:t>
+              <a:t>3/12/2023</a:t>
             </a:fld>
             <a:endParaRPr lang="en-US"/>
           </a:p>
@@ -1856,7 +1856,7 @@
           <a:p>
             <a:fld id="{6AFFC431-35AA-48DF-B824-772EF10EA9D4}" type="datetimeFigureOut">
               <a:rPr lang="en-US" smtClean="0"/>
-              <a:t>3/10/2023</a:t>
+              <a:t>3/12/2023</a:t>
             </a:fld>
             <a:endParaRPr lang="en-US"/>
           </a:p>
@@ -1997,7 +1997,7 @@
           <a:p>
             <a:fld id="{6AFFC431-35AA-48DF-B824-772EF10EA9D4}" type="datetimeFigureOut">
               <a:rPr lang="en-US" smtClean="0"/>
-              <a:t>3/10/2023</a:t>
+              <a:t>3/12/2023</a:t>
             </a:fld>
             <a:endParaRPr lang="en-US"/>
           </a:p>
@@ -2110,7 +2110,7 @@
           <a:p>
             <a:fld id="{6AFFC431-35AA-48DF-B824-772EF10EA9D4}" type="datetimeFigureOut">
               <a:rPr lang="en-US" smtClean="0"/>
-              <a:t>3/10/2023</a:t>
+              <a:t>3/12/2023</a:t>
             </a:fld>
             <a:endParaRPr lang="en-US"/>
           </a:p>
@@ -2421,7 +2421,7 @@
           <a:p>
             <a:fld id="{6AFFC431-35AA-48DF-B824-772EF10EA9D4}" type="datetimeFigureOut">
               <a:rPr lang="en-US" smtClean="0"/>
-              <a:t>3/10/2023</a:t>
+              <a:t>3/12/2023</a:t>
             </a:fld>
             <a:endParaRPr lang="en-US"/>
           </a:p>
@@ -2709,7 +2709,7 @@
           <a:p>
             <a:fld id="{6AFFC431-35AA-48DF-B824-772EF10EA9D4}" type="datetimeFigureOut">
               <a:rPr lang="en-US" smtClean="0"/>
-              <a:t>3/10/2023</a:t>
+              <a:t>3/12/2023</a:t>
             </a:fld>
             <a:endParaRPr lang="en-US"/>
           </a:p>
@@ -2950,7 +2950,7 @@
           <a:p>
             <a:fld id="{6AFFC431-35AA-48DF-B824-772EF10EA9D4}" type="datetimeFigureOut">
               <a:rPr lang="en-US" smtClean="0"/>
-              <a:t>3/10/2023</a:t>
+              <a:t>3/12/2023</a:t>
             </a:fld>
             <a:endParaRPr lang="en-US"/>
           </a:p>
@@ -3381,7 +3381,7 @@
         </p:nvSpPr>
         <p:spPr>
           <a:xfrm>
-            <a:off x="3464349" y="521395"/>
+            <a:off x="3455723" y="521395"/>
             <a:ext cx="3954545" cy="1465868"/>
           </a:xfrm>
           <a:prstGeom prst="rect">
@@ -3485,7 +3485,7 @@
         </p:nvSpPr>
         <p:spPr>
           <a:xfrm>
-            <a:off x="7412588" y="847110"/>
+            <a:off x="7403962" y="847110"/>
             <a:ext cx="1038497" cy="796834"/>
           </a:xfrm>
           <a:prstGeom prst="rect">
@@ -3589,7 +3589,7 @@
         </p:nvSpPr>
         <p:spPr>
           <a:xfrm>
-            <a:off x="8457415" y="1004226"/>
+            <a:off x="8448789" y="1004226"/>
             <a:ext cx="735245" cy="461420"/>
           </a:xfrm>
           <a:prstGeom prst="rect">
@@ -3763,7 +3763,7 @@
         </p:nvSpPr>
         <p:spPr>
           <a:xfrm>
-            <a:off x="3312989" y="10801"/>
+            <a:off x="3354329" y="98712"/>
             <a:ext cx="317716" cy="369332"/>
           </a:xfrm>
           <a:prstGeom prst="rect">
@@ -4616,176 +4616,6 @@
           </a:fontRef>
         </p:style>
       </p:cxnSp>
-      <p:grpSp>
-        <p:nvGrpSpPr>
-          <p:cNvPr id="63" name="Group 62">
-            <a:extLst>
-              <a:ext uri="{FF2B5EF4-FFF2-40B4-BE49-F238E27FC236}">
-                <a16:creationId xmlns:a16="http://schemas.microsoft.com/office/drawing/2014/main" id="{A8B2BA00-EFEF-BA4F-E18E-6307FC2BB9CC}"/>
-              </a:ext>
-            </a:extLst>
-          </p:cNvPr>
-          <p:cNvGrpSpPr/>
-          <p:nvPr/>
-        </p:nvGrpSpPr>
-        <p:grpSpPr>
-          <a:xfrm rot="4788885">
-            <a:off x="10093466" y="3938028"/>
-            <a:ext cx="537328" cy="505746"/>
-            <a:chOff x="5019773" y="4363040"/>
-            <a:chExt cx="917541" cy="969230"/>
-          </a:xfrm>
-        </p:grpSpPr>
-        <p:sp>
-          <p:nvSpPr>
-            <p:cNvPr id="60" name="Arc 59">
-              <a:extLst>
-                <a:ext uri="{FF2B5EF4-FFF2-40B4-BE49-F238E27FC236}">
-                  <a16:creationId xmlns:a16="http://schemas.microsoft.com/office/drawing/2014/main" id="{D5562FDB-03A6-4257-FBBD-D9DD030744CB}"/>
-                </a:ext>
-              </a:extLst>
-            </p:cNvPr>
-            <p:cNvSpPr/>
-            <p:nvPr/>
-          </p:nvSpPr>
-          <p:spPr>
-            <a:xfrm rot="16615571">
-              <a:off x="5022914" y="4363040"/>
-              <a:ext cx="914400" cy="914400"/>
-            </a:xfrm>
-            <a:prstGeom prst="arc">
-              <a:avLst/>
-            </a:prstGeom>
-            <a:ln w="38100">
-              <a:solidFill>
-                <a:schemeClr val="tx1"/>
-              </a:solidFill>
-            </a:ln>
-          </p:spPr>
-          <p:style>
-            <a:lnRef idx="1">
-              <a:schemeClr val="accent1"/>
-            </a:lnRef>
-            <a:fillRef idx="0">
-              <a:schemeClr val="accent1"/>
-            </a:fillRef>
-            <a:effectRef idx="0">
-              <a:schemeClr val="accent1"/>
-            </a:effectRef>
-            <a:fontRef idx="minor">
-              <a:schemeClr val="tx1"/>
-            </a:fontRef>
-          </p:style>
-          <p:txBody>
-            <a:bodyPr rtlCol="0" anchor="ctr"/>
-            <a:lstStyle/>
-            <a:p>
-              <a:pPr algn="ctr"/>
-              <a:endParaRPr lang="en-US"/>
-            </a:p>
-          </p:txBody>
-        </p:sp>
-        <p:sp>
-          <p:nvSpPr>
-            <p:cNvPr id="61" name="Arc 60">
-              <a:extLst>
-                <a:ext uri="{FF2B5EF4-FFF2-40B4-BE49-F238E27FC236}">
-                  <a16:creationId xmlns:a16="http://schemas.microsoft.com/office/drawing/2014/main" id="{0D52C944-F3B1-B3BC-4FCC-3F9C1766DF02}"/>
-                </a:ext>
-              </a:extLst>
-            </p:cNvPr>
-            <p:cNvSpPr/>
-            <p:nvPr/>
-          </p:nvSpPr>
-          <p:spPr>
-            <a:xfrm rot="11399403">
-              <a:off x="5019773" y="4383463"/>
-              <a:ext cx="914400" cy="914400"/>
-            </a:xfrm>
-            <a:prstGeom prst="arc">
-              <a:avLst/>
-            </a:prstGeom>
-            <a:ln w="38100">
-              <a:solidFill>
-                <a:schemeClr val="tx1"/>
-              </a:solidFill>
-              <a:headEnd type="arrow" w="med" len="med"/>
-              <a:tailEnd type="none" w="med" len="med"/>
-            </a:ln>
-          </p:spPr>
-          <p:style>
-            <a:lnRef idx="1">
-              <a:schemeClr val="accent1"/>
-            </a:lnRef>
-            <a:fillRef idx="0">
-              <a:schemeClr val="accent1"/>
-            </a:fillRef>
-            <a:effectRef idx="0">
-              <a:schemeClr val="accent1"/>
-            </a:effectRef>
-            <a:fontRef idx="minor">
-              <a:schemeClr val="tx1"/>
-            </a:fontRef>
-          </p:style>
-          <p:txBody>
-            <a:bodyPr rtlCol="0" anchor="ctr"/>
-            <a:lstStyle/>
-            <a:p>
-              <a:pPr algn="ctr"/>
-              <a:endParaRPr lang="en-US" dirty="0"/>
-            </a:p>
-          </p:txBody>
-        </p:sp>
-        <p:sp>
-          <p:nvSpPr>
-            <p:cNvPr id="62" name="Arc 61">
-              <a:extLst>
-                <a:ext uri="{FF2B5EF4-FFF2-40B4-BE49-F238E27FC236}">
-                  <a16:creationId xmlns:a16="http://schemas.microsoft.com/office/drawing/2014/main" id="{4351D192-5B75-D434-D892-C799BCB8CC18}"/>
-                </a:ext>
-              </a:extLst>
-            </p:cNvPr>
-            <p:cNvSpPr/>
-            <p:nvPr/>
-          </p:nvSpPr>
-          <p:spPr>
-            <a:xfrm rot="392529">
-              <a:off x="5022240" y="4364013"/>
-              <a:ext cx="902476" cy="968257"/>
-            </a:xfrm>
-            <a:prstGeom prst="arc">
-              <a:avLst/>
-            </a:prstGeom>
-            <a:ln w="38100">
-              <a:solidFill>
-                <a:schemeClr val="tx1"/>
-              </a:solidFill>
-            </a:ln>
-          </p:spPr>
-          <p:style>
-            <a:lnRef idx="1">
-              <a:schemeClr val="accent1"/>
-            </a:lnRef>
-            <a:fillRef idx="0">
-              <a:schemeClr val="accent1"/>
-            </a:fillRef>
-            <a:effectRef idx="0">
-              <a:schemeClr val="accent1"/>
-            </a:effectRef>
-            <a:fontRef idx="minor">
-              <a:schemeClr val="tx1"/>
-            </a:fontRef>
-          </p:style>
-          <p:txBody>
-            <a:bodyPr rtlCol="0" anchor="ctr"/>
-            <a:lstStyle/>
-            <a:p>
-              <a:pPr algn="ctr"/>
-              <a:endParaRPr lang="en-US" dirty="0"/>
-            </a:p>
-          </p:txBody>
-        </p:sp>
-      </p:grpSp>
       <p:cxnSp>
         <p:nvCxnSpPr>
           <p:cNvPr id="72" name="Straight Arrow Connector 71">
@@ -4802,7 +4632,7 @@
         </p:nvCxnSpPr>
         <p:spPr>
           <a:xfrm flipH="1">
-            <a:off x="10134465" y="1240271"/>
+            <a:off x="9939025" y="1234249"/>
             <a:ext cx="846218" cy="0"/>
           </a:xfrm>
           <a:prstGeom prst="straightConnector1">
@@ -4843,7 +4673,7 @@
         </p:nvCxnSpPr>
         <p:spPr>
           <a:xfrm flipV="1">
-            <a:off x="10158113" y="1460987"/>
+            <a:off x="9941458" y="1246643"/>
             <a:ext cx="0" cy="698883"/>
           </a:xfrm>
           <a:prstGeom prst="straightConnector1">
@@ -5441,7 +5271,7 @@
         </p:nvCxnSpPr>
         <p:spPr>
           <a:xfrm flipV="1">
-            <a:off x="10066146" y="4466945"/>
+            <a:off x="9895785" y="4415182"/>
             <a:ext cx="0" cy="698883"/>
           </a:xfrm>
           <a:prstGeom prst="straightConnector1">
@@ -5482,7 +5312,7 @@
         </p:nvCxnSpPr>
         <p:spPr>
           <a:xfrm flipV="1">
-            <a:off x="2942759" y="488779"/>
+            <a:off x="2937504" y="633793"/>
             <a:ext cx="0" cy="698883"/>
           </a:xfrm>
           <a:prstGeom prst="straightConnector1">
@@ -5523,7 +5353,7 @@
         </p:nvCxnSpPr>
         <p:spPr>
           <a:xfrm flipV="1">
-            <a:off x="7995607" y="496659"/>
+            <a:off x="7964079" y="610797"/>
             <a:ext cx="0" cy="698883"/>
           </a:xfrm>
           <a:prstGeom prst="straightConnector1">
@@ -5562,7 +5392,7 @@
         </p:nvSpPr>
         <p:spPr>
           <a:xfrm>
-            <a:off x="7594125" y="86710"/>
+            <a:off x="7559909" y="198274"/>
             <a:ext cx="953037" cy="400110"/>
           </a:xfrm>
           <a:prstGeom prst="rect">
@@ -5640,7 +5470,7 @@
         </p:nvSpPr>
         <p:spPr>
           <a:xfrm>
-            <a:off x="2756739" y="152400"/>
+            <a:off x="2739573" y="212302"/>
             <a:ext cx="953037" cy="400110"/>
           </a:xfrm>
           <a:prstGeom prst="rect">
@@ -5718,7 +5548,7 @@
         </p:nvSpPr>
         <p:spPr>
           <a:xfrm>
-            <a:off x="7397057" y="827690"/>
+            <a:off x="7335735" y="854219"/>
             <a:ext cx="953037" cy="400110"/>
           </a:xfrm>
           <a:prstGeom prst="rect">
@@ -5757,7 +5587,7 @@
         </p:nvSpPr>
         <p:spPr>
           <a:xfrm>
-            <a:off x="10287401" y="746234"/>
+            <a:off x="10091961" y="740212"/>
             <a:ext cx="953037" cy="400110"/>
           </a:xfrm>
           <a:prstGeom prst="rect">
@@ -5798,7 +5628,7 @@
         </p:nvCxnSpPr>
         <p:spPr>
           <a:xfrm flipV="1">
-            <a:off x="2937504" y="3526268"/>
+            <a:off x="2937419" y="3640202"/>
             <a:ext cx="0" cy="698883"/>
           </a:xfrm>
           <a:prstGeom prst="straightConnector1">
@@ -5839,7 +5669,7 @@
         </p:nvCxnSpPr>
         <p:spPr>
           <a:xfrm flipV="1">
-            <a:off x="7990352" y="3534148"/>
+            <a:off x="7970923" y="3594553"/>
             <a:ext cx="0" cy="698883"/>
           </a:xfrm>
           <a:prstGeom prst="straightConnector1">
@@ -5878,7 +5708,7 @@
         </p:nvSpPr>
         <p:spPr>
           <a:xfrm>
-            <a:off x="7588870" y="3124199"/>
+            <a:off x="7569441" y="3184604"/>
             <a:ext cx="953037" cy="400110"/>
           </a:xfrm>
           <a:prstGeom prst="rect">
@@ -5893,13 +5723,14 @@
           <a:lstStyle/>
           <a:p>
             <a:r>
-              <a:rPr lang="en-US" sz="2000" b="1" dirty="0"/>
+              <a:rPr lang="en-US" sz="2000" b="1" dirty="0" err="1"/>
               <a:t>R</a:t>
             </a:r>
             <a:r>
-              <a:rPr lang="en-US" sz="2000" b="1" baseline="-25000" dirty="0"/>
-              <a:t>a_x</a:t>
-            </a:r>
+              <a:rPr lang="en-US" sz="2000" b="1" baseline="-25000" dirty="0" err="1"/>
+              <a:t>b_x</a:t>
+            </a:r>
+            <a:endParaRPr lang="en-US" sz="2000" b="1" baseline="-25000" dirty="0"/>
           </a:p>
         </p:txBody>
       </p:sp>
@@ -5917,7 +5748,7 @@
         </p:nvSpPr>
         <p:spPr>
           <a:xfrm>
-            <a:off x="10269008" y="1642241"/>
+            <a:off x="10052353" y="1427897"/>
             <a:ext cx="953037" cy="400110"/>
           </a:xfrm>
           <a:prstGeom prst="rect">
@@ -5956,7 +5787,7 @@
         </p:nvSpPr>
         <p:spPr>
           <a:xfrm>
-            <a:off x="9822318" y="5223641"/>
+            <a:off x="9899071" y="4878766"/>
             <a:ext cx="953037" cy="400110"/>
           </a:xfrm>
           <a:prstGeom prst="rect">
@@ -5977,45 +5808,6 @@
             <a:r>
               <a:rPr lang="en-US" sz="2000" b="1" baseline="-25000" dirty="0"/>
               <a:t>cut_x</a:t>
-            </a:r>
-          </a:p>
-        </p:txBody>
-      </p:sp>
-      <p:sp>
-        <p:nvSpPr>
-          <p:cNvPr id="115" name="TextBox 114">
-            <a:extLst>
-              <a:ext uri="{FF2B5EF4-FFF2-40B4-BE49-F238E27FC236}">
-                <a16:creationId xmlns:a16="http://schemas.microsoft.com/office/drawing/2014/main" id="{6E6D56D5-0DEE-9F5D-0A0D-F00B4A217E8E}"/>
-              </a:ext>
-            </a:extLst>
-          </p:cNvPr>
-          <p:cNvSpPr txBox="1"/>
-          <p:nvPr/>
-        </p:nvSpPr>
-        <p:spPr>
-          <a:xfrm>
-            <a:off x="10254523" y="3518451"/>
-            <a:ext cx="953037" cy="400110"/>
-          </a:xfrm>
-          <a:prstGeom prst="rect">
-            <a:avLst/>
-          </a:prstGeom>
-          <a:noFill/>
-        </p:spPr>
-        <p:txBody>
-          <a:bodyPr wrap="square" rtlCol="0">
-            <a:spAutoFit/>
-          </a:bodyPr>
-          <a:lstStyle/>
-          <a:p>
-            <a:r>
-              <a:rPr lang="en-US" sz="2000" b="1" dirty="0"/>
-              <a:t>M</a:t>
-            </a:r>
-            <a:r>
-              <a:rPr lang="en-US" sz="2000" b="1" baseline="-25000" dirty="0"/>
-              <a:t>c_cross</a:t>
             </a:r>
           </a:p>
         </p:txBody>
@@ -6434,7 +6226,7 @@
         </p:nvSpPr>
         <p:spPr>
           <a:xfrm>
-            <a:off x="2603377" y="3123348"/>
+            <a:off x="2603292" y="3237282"/>
             <a:ext cx="953037" cy="400110"/>
           </a:xfrm>
           <a:prstGeom prst="rect">
@@ -6763,7 +6555,7 @@
         </p:nvCxnSpPr>
         <p:spPr>
           <a:xfrm flipV="1">
-            <a:off x="2034128" y="5928951"/>
+            <a:off x="2124608" y="5850799"/>
             <a:ext cx="0" cy="516038"/>
           </a:xfrm>
           <a:prstGeom prst="straightConnector1">
@@ -6802,7 +6594,7 @@
         </p:nvSpPr>
         <p:spPr>
           <a:xfrm>
-            <a:off x="1305675" y="5827074"/>
+            <a:off x="1474044" y="5988895"/>
             <a:ext cx="953037" cy="400110"/>
           </a:xfrm>
           <a:prstGeom prst="rect">
@@ -6823,6 +6615,326 @@
             <a:r>
               <a:rPr lang="en-US" sz="2000" b="1" baseline="-25000" dirty="0"/>
               <a:t>cut_y</a:t>
+            </a:r>
+          </a:p>
+        </p:txBody>
+      </p:sp>
+      <p:cxnSp>
+        <p:nvCxnSpPr>
+          <p:cNvPr id="31" name="Straight Arrow Connector 30">
+            <a:extLst>
+              <a:ext uri="{FF2B5EF4-FFF2-40B4-BE49-F238E27FC236}">
+                <a16:creationId xmlns:a16="http://schemas.microsoft.com/office/drawing/2014/main" id="{0FE79482-ACFA-BA90-27BC-75A2D766B88E}"/>
+              </a:ext>
+            </a:extLst>
+          </p:cNvPr>
+          <p:cNvCxnSpPr>
+            <a:cxnSpLocks/>
+          </p:cNvCxnSpPr>
+          <p:nvPr/>
+        </p:nvCxnSpPr>
+        <p:spPr>
+          <a:xfrm flipH="1">
+            <a:off x="9882599" y="4407711"/>
+            <a:ext cx="846218" cy="0"/>
+          </a:xfrm>
+          <a:prstGeom prst="straightConnector1">
+            <a:avLst/>
+          </a:prstGeom>
+          <a:ln w="38100">
+            <a:tailEnd type="triangle"/>
+          </a:ln>
+        </p:spPr>
+        <p:style>
+          <a:lnRef idx="1">
+            <a:schemeClr val="dk1"/>
+          </a:lnRef>
+          <a:fillRef idx="0">
+            <a:schemeClr val="dk1"/>
+          </a:fillRef>
+          <a:effectRef idx="0">
+            <a:schemeClr val="dk1"/>
+          </a:effectRef>
+          <a:fontRef idx="minor">
+            <a:schemeClr val="tx1"/>
+          </a:fontRef>
+        </p:style>
+      </p:cxnSp>
+      <p:sp>
+        <p:nvSpPr>
+          <p:cNvPr id="33" name="TextBox 32">
+            <a:extLst>
+              <a:ext uri="{FF2B5EF4-FFF2-40B4-BE49-F238E27FC236}">
+                <a16:creationId xmlns:a16="http://schemas.microsoft.com/office/drawing/2014/main" id="{B324FA45-5175-0895-CE0F-6BF628EEA5D7}"/>
+              </a:ext>
+            </a:extLst>
+          </p:cNvPr>
+          <p:cNvSpPr txBox="1"/>
+          <p:nvPr/>
+        </p:nvSpPr>
+        <p:spPr>
+          <a:xfrm>
+            <a:off x="10101933" y="3928497"/>
+            <a:ext cx="953037" cy="400110"/>
+          </a:xfrm>
+          <a:prstGeom prst="rect">
+            <a:avLst/>
+          </a:prstGeom>
+          <a:noFill/>
+        </p:spPr>
+        <p:txBody>
+          <a:bodyPr wrap="square" rtlCol="0">
+            <a:spAutoFit/>
+          </a:bodyPr>
+          <a:lstStyle/>
+          <a:p>
+            <a:r>
+              <a:rPr lang="en-US" sz="2000" b="1" dirty="0"/>
+              <a:t>F</a:t>
+            </a:r>
+            <a:r>
+              <a:rPr lang="en-US" sz="2000" b="1" baseline="-25000" dirty="0"/>
+              <a:t>feed_z</a:t>
+            </a:r>
+          </a:p>
+        </p:txBody>
+      </p:sp>
+      <p:cxnSp>
+        <p:nvCxnSpPr>
+          <p:cNvPr id="34" name="Straight Arrow Connector 33">
+            <a:extLst>
+              <a:ext uri="{FF2B5EF4-FFF2-40B4-BE49-F238E27FC236}">
+                <a16:creationId xmlns:a16="http://schemas.microsoft.com/office/drawing/2014/main" id="{5345EC27-BD86-C84E-3E8D-1EA7E07FCAD4}"/>
+              </a:ext>
+            </a:extLst>
+          </p:cNvPr>
+          <p:cNvCxnSpPr>
+            <a:cxnSpLocks/>
+          </p:cNvCxnSpPr>
+          <p:nvPr/>
+        </p:nvCxnSpPr>
+        <p:spPr>
+          <a:xfrm>
+            <a:off x="2292515" y="4336130"/>
+            <a:ext cx="623740" cy="0"/>
+          </a:xfrm>
+          <a:prstGeom prst="straightConnector1">
+            <a:avLst/>
+          </a:prstGeom>
+          <a:ln w="38100">
+            <a:tailEnd type="triangle"/>
+          </a:ln>
+        </p:spPr>
+        <p:style>
+          <a:lnRef idx="1">
+            <a:schemeClr val="dk1"/>
+          </a:lnRef>
+          <a:fillRef idx="0">
+            <a:schemeClr val="dk1"/>
+          </a:fillRef>
+          <a:effectRef idx="0">
+            <a:schemeClr val="dk1"/>
+          </a:effectRef>
+          <a:fontRef idx="minor">
+            <a:schemeClr val="tx1"/>
+          </a:fontRef>
+        </p:style>
+      </p:cxnSp>
+      <p:cxnSp>
+        <p:nvCxnSpPr>
+          <p:cNvPr id="35" name="Straight Arrow Connector 34">
+            <a:extLst>
+              <a:ext uri="{FF2B5EF4-FFF2-40B4-BE49-F238E27FC236}">
+                <a16:creationId xmlns:a16="http://schemas.microsoft.com/office/drawing/2014/main" id="{4423AB57-EF11-7E31-73C8-C5C4CF313441}"/>
+              </a:ext>
+            </a:extLst>
+          </p:cNvPr>
+          <p:cNvCxnSpPr>
+            <a:cxnSpLocks/>
+          </p:cNvCxnSpPr>
+          <p:nvPr/>
+        </p:nvCxnSpPr>
+        <p:spPr>
+          <a:xfrm>
+            <a:off x="7323287" y="4285853"/>
+            <a:ext cx="623740" cy="0"/>
+          </a:xfrm>
+          <a:prstGeom prst="straightConnector1">
+            <a:avLst/>
+          </a:prstGeom>
+          <a:ln w="38100">
+            <a:tailEnd type="triangle"/>
+          </a:ln>
+        </p:spPr>
+        <p:style>
+          <a:lnRef idx="1">
+            <a:schemeClr val="dk1"/>
+          </a:lnRef>
+          <a:fillRef idx="0">
+            <a:schemeClr val="dk1"/>
+          </a:fillRef>
+          <a:effectRef idx="0">
+            <a:schemeClr val="dk1"/>
+          </a:effectRef>
+          <a:fontRef idx="minor">
+            <a:schemeClr val="tx1"/>
+          </a:fontRef>
+        </p:style>
+      </p:cxnSp>
+      <p:sp>
+        <p:nvSpPr>
+          <p:cNvPr id="36" name="TextBox 35">
+            <a:extLst>
+              <a:ext uri="{FF2B5EF4-FFF2-40B4-BE49-F238E27FC236}">
+                <a16:creationId xmlns:a16="http://schemas.microsoft.com/office/drawing/2014/main" id="{03932891-8BC6-F32C-F4D9-9B315A0CD46D}"/>
+              </a:ext>
+            </a:extLst>
+          </p:cNvPr>
+          <p:cNvSpPr txBox="1"/>
+          <p:nvPr/>
+        </p:nvSpPr>
+        <p:spPr>
+          <a:xfrm>
+            <a:off x="2348177" y="3873272"/>
+            <a:ext cx="953037" cy="400110"/>
+          </a:xfrm>
+          <a:prstGeom prst="rect">
+            <a:avLst/>
+          </a:prstGeom>
+          <a:noFill/>
+        </p:spPr>
+        <p:txBody>
+          <a:bodyPr wrap="square" rtlCol="0">
+            <a:spAutoFit/>
+          </a:bodyPr>
+          <a:lstStyle/>
+          <a:p>
+            <a:r>
+              <a:rPr lang="en-US" sz="2000" b="1" dirty="0"/>
+              <a:t>R</a:t>
+            </a:r>
+            <a:r>
+              <a:rPr lang="en-US" sz="2000" b="1" baseline="-25000" dirty="0"/>
+              <a:t>a_z</a:t>
+            </a:r>
+          </a:p>
+        </p:txBody>
+      </p:sp>
+      <p:sp>
+        <p:nvSpPr>
+          <p:cNvPr id="37" name="TextBox 36">
+            <a:extLst>
+              <a:ext uri="{FF2B5EF4-FFF2-40B4-BE49-F238E27FC236}">
+                <a16:creationId xmlns:a16="http://schemas.microsoft.com/office/drawing/2014/main" id="{179BC6E1-4E28-50E8-A37D-79CB573DAF50}"/>
+              </a:ext>
+            </a:extLst>
+          </p:cNvPr>
+          <p:cNvSpPr txBox="1"/>
+          <p:nvPr/>
+        </p:nvSpPr>
+        <p:spPr>
+          <a:xfrm>
+            <a:off x="7318683" y="3847249"/>
+            <a:ext cx="953037" cy="400110"/>
+          </a:xfrm>
+          <a:prstGeom prst="rect">
+            <a:avLst/>
+          </a:prstGeom>
+          <a:noFill/>
+        </p:spPr>
+        <p:txBody>
+          <a:bodyPr wrap="square" rtlCol="0">
+            <a:spAutoFit/>
+          </a:bodyPr>
+          <a:lstStyle/>
+          <a:p>
+            <a:r>
+              <a:rPr lang="en-US" sz="2000" b="1" dirty="0"/>
+              <a:t>R</a:t>
+            </a:r>
+            <a:r>
+              <a:rPr lang="en-US" sz="2000" b="1" baseline="-25000" dirty="0"/>
+              <a:t>b_z</a:t>
+            </a:r>
+          </a:p>
+        </p:txBody>
+      </p:sp>
+      <p:cxnSp>
+        <p:nvCxnSpPr>
+          <p:cNvPr id="38" name="Straight Arrow Connector 37">
+            <a:extLst>
+              <a:ext uri="{FF2B5EF4-FFF2-40B4-BE49-F238E27FC236}">
+                <a16:creationId xmlns:a16="http://schemas.microsoft.com/office/drawing/2014/main" id="{2379F883-1AF1-E6CE-749D-27EBA1779289}"/>
+              </a:ext>
+            </a:extLst>
+          </p:cNvPr>
+          <p:cNvCxnSpPr>
+            <a:cxnSpLocks/>
+          </p:cNvCxnSpPr>
+          <p:nvPr/>
+        </p:nvCxnSpPr>
+        <p:spPr>
+          <a:xfrm>
+            <a:off x="1405375" y="5830892"/>
+            <a:ext cx="731377" cy="0"/>
+          </a:xfrm>
+          <a:prstGeom prst="straightConnector1">
+            <a:avLst/>
+          </a:prstGeom>
+          <a:ln w="38100">
+            <a:tailEnd type="triangle"/>
+          </a:ln>
+        </p:spPr>
+        <p:style>
+          <a:lnRef idx="1">
+            <a:schemeClr val="dk1"/>
+          </a:lnRef>
+          <a:fillRef idx="0">
+            <a:schemeClr val="dk1"/>
+          </a:fillRef>
+          <a:effectRef idx="0">
+            <a:schemeClr val="dk1"/>
+          </a:effectRef>
+          <a:fontRef idx="minor">
+            <a:schemeClr val="tx1"/>
+          </a:fontRef>
+        </p:style>
+      </p:cxnSp>
+      <p:sp>
+        <p:nvSpPr>
+          <p:cNvPr id="39" name="TextBox 38">
+            <a:extLst>
+              <a:ext uri="{FF2B5EF4-FFF2-40B4-BE49-F238E27FC236}">
+                <a16:creationId xmlns:a16="http://schemas.microsoft.com/office/drawing/2014/main" id="{1EE3B9D7-2966-7114-EB5B-30750087A2B0}"/>
+              </a:ext>
+            </a:extLst>
+          </p:cNvPr>
+          <p:cNvSpPr txBox="1"/>
+          <p:nvPr/>
+        </p:nvSpPr>
+        <p:spPr>
+          <a:xfrm>
+            <a:off x="1382502" y="5431156"/>
+            <a:ext cx="953037" cy="400110"/>
+          </a:xfrm>
+          <a:prstGeom prst="rect">
+            <a:avLst/>
+          </a:prstGeom>
+          <a:noFill/>
+        </p:spPr>
+        <p:txBody>
+          <a:bodyPr wrap="square" rtlCol="0">
+            <a:spAutoFit/>
+          </a:bodyPr>
+          <a:lstStyle/>
+          <a:p>
+            <a:r>
+              <a:rPr lang="en-US" sz="2000" b="1" dirty="0"/>
+              <a:t>F</a:t>
+            </a:r>
+            <a:r>
+              <a:rPr lang="en-US" sz="2000" b="1" baseline="-25000" dirty="0"/>
+              <a:t>cut_x</a:t>
             </a:r>
           </a:p>
         </p:txBody>

</xml_diff>